<commit_message>
Solution for egg drop
</commit_message>
<xml_diff>
--- a/Week_09_Instructor_Choice/18_/slides/Animation.pptx
+++ b/Week_09_Instructor_Choice/18_/slides/Animation.pptx
@@ -301,7 +301,7 @@
           <a:p>
             <a:fld id="{755E012D-88F6-4C49-AF3C-89483E5FC823}" type="datetimeFigureOut">
               <a:rPr lang="en-US" smtClean="0"/>
-              <a:t>9/22/2013</a:t>
+              <a:t>9/23/2013</a:t>
             </a:fld>
             <a:endParaRPr lang="en-US"/>
           </a:p>
@@ -471,7 +471,7 @@
           <a:p>
             <a:fld id="{755E012D-88F6-4C49-AF3C-89483E5FC823}" type="datetimeFigureOut">
               <a:rPr lang="en-US" smtClean="0"/>
-              <a:t>9/22/2013</a:t>
+              <a:t>9/23/2013</a:t>
             </a:fld>
             <a:endParaRPr lang="en-US"/>
           </a:p>
@@ -651,7 +651,7 @@
           <a:p>
             <a:fld id="{755E012D-88F6-4C49-AF3C-89483E5FC823}" type="datetimeFigureOut">
               <a:rPr lang="en-US" smtClean="0"/>
-              <a:t>9/22/2013</a:t>
+              <a:t>9/23/2013</a:t>
             </a:fld>
             <a:endParaRPr lang="en-US"/>
           </a:p>
@@ -821,7 +821,7 @@
           <a:p>
             <a:fld id="{755E012D-88F6-4C49-AF3C-89483E5FC823}" type="datetimeFigureOut">
               <a:rPr lang="en-US" smtClean="0"/>
-              <a:t>9/22/2013</a:t>
+              <a:t>9/23/2013</a:t>
             </a:fld>
             <a:endParaRPr lang="en-US"/>
           </a:p>
@@ -1067,7 +1067,7 @@
           <a:p>
             <a:fld id="{755E012D-88F6-4C49-AF3C-89483E5FC823}" type="datetimeFigureOut">
               <a:rPr lang="en-US" smtClean="0"/>
-              <a:t>9/22/2013</a:t>
+              <a:t>9/23/2013</a:t>
             </a:fld>
             <a:endParaRPr lang="en-US"/>
           </a:p>
@@ -1355,7 +1355,7 @@
           <a:p>
             <a:fld id="{755E012D-88F6-4C49-AF3C-89483E5FC823}" type="datetimeFigureOut">
               <a:rPr lang="en-US" smtClean="0"/>
-              <a:t>9/22/2013</a:t>
+              <a:t>9/23/2013</a:t>
             </a:fld>
             <a:endParaRPr lang="en-US"/>
           </a:p>
@@ -1777,7 +1777,7 @@
           <a:p>
             <a:fld id="{755E012D-88F6-4C49-AF3C-89483E5FC823}" type="datetimeFigureOut">
               <a:rPr lang="en-US" smtClean="0"/>
-              <a:t>9/22/2013</a:t>
+              <a:t>9/23/2013</a:t>
             </a:fld>
             <a:endParaRPr lang="en-US"/>
           </a:p>
@@ -1895,7 +1895,7 @@
           <a:p>
             <a:fld id="{755E012D-88F6-4C49-AF3C-89483E5FC823}" type="datetimeFigureOut">
               <a:rPr lang="en-US" smtClean="0"/>
-              <a:t>9/22/2013</a:t>
+              <a:t>9/23/2013</a:t>
             </a:fld>
             <a:endParaRPr lang="en-US"/>
           </a:p>
@@ -1990,7 +1990,7 @@
           <a:p>
             <a:fld id="{755E012D-88F6-4C49-AF3C-89483E5FC823}" type="datetimeFigureOut">
               <a:rPr lang="en-US" smtClean="0"/>
-              <a:t>9/22/2013</a:t>
+              <a:t>9/23/2013</a:t>
             </a:fld>
             <a:endParaRPr lang="en-US"/>
           </a:p>
@@ -2267,7 +2267,7 @@
           <a:p>
             <a:fld id="{755E012D-88F6-4C49-AF3C-89483E5FC823}" type="datetimeFigureOut">
               <a:rPr lang="en-US" smtClean="0"/>
-              <a:t>9/22/2013</a:t>
+              <a:t>9/23/2013</a:t>
             </a:fld>
             <a:endParaRPr lang="en-US"/>
           </a:p>
@@ -2520,7 +2520,7 @@
           <a:p>
             <a:fld id="{755E012D-88F6-4C49-AF3C-89483E5FC823}" type="datetimeFigureOut">
               <a:rPr lang="en-US" smtClean="0"/>
-              <a:t>9/22/2013</a:t>
+              <a:t>9/23/2013</a:t>
             </a:fld>
             <a:endParaRPr lang="en-US"/>
           </a:p>
@@ -2733,7 +2733,7 @@
           <a:p>
             <a:fld id="{755E012D-88F6-4C49-AF3C-89483E5FC823}" type="datetimeFigureOut">
               <a:rPr lang="en-US" smtClean="0"/>
-              <a:t>9/22/2013</a:t>
+              <a:t>9/23/2013</a:t>
             </a:fld>
             <a:endParaRPr lang="en-US"/>
           </a:p>
@@ -3633,7 +3633,7 @@
         <p:spPr/>
         <p:txBody>
           <a:bodyPr>
-            <a:normAutofit lnSpcReduction="10000"/>
+            <a:normAutofit fontScale="85000" lnSpcReduction="10000"/>
           </a:bodyPr>
           <a:lstStyle/>
           <a:p>
@@ -3655,11 +3655,7 @@
             </a:r>
             <a:r>
               <a:rPr lang="en-US" dirty="0" smtClean="0"/>
-              <a:t>”,</a:t>
-            </a:r>
-            <a:r>
-              <a:rPr lang="en-US" dirty="0" smtClean="0"/>
-              <a:t> “.</a:t>
+              <a:t>”, “.</a:t>
             </a:r>
             <a:r>
               <a:rPr lang="en-US" dirty="0" err="1" smtClean="0"/>
@@ -3671,11 +3667,7 @@
             </a:r>
             <a:r>
               <a:rPr lang="en-US" dirty="0" err="1" smtClean="0"/>
-              <a:t>left”,</a:t>
-            </a:r>
-            <a:r>
-              <a:rPr lang="en-US" dirty="0" err="1" smtClean="0"/>
-              <a:t>function</a:t>
+              <a:t>left”,function</a:t>
             </a:r>
             <a:r>
               <a:rPr lang="en-US" dirty="0" smtClean="0"/>
@@ -3747,7 +3739,32 @@
             </a:r>
             <a:r>
               <a:rPr lang="en-US" dirty="0" smtClean="0"/>
-              <a:t> for animations</a:t>
+              <a:t> for </a:t>
+            </a:r>
+            <a:r>
+              <a:rPr lang="en-US" dirty="0" smtClean="0"/>
+              <a:t>animations</a:t>
+            </a:r>
+          </a:p>
+          <a:p>
+            <a:pPr marL="0" indent="0">
+              <a:buNone/>
+            </a:pPr>
+            <a:r>
+              <a:rPr lang="en-US" dirty="0" smtClean="0"/>
+              <a:t>*Instructor: example files do not include the on animation end or </a:t>
+            </a:r>
+            <a:r>
+              <a:rPr lang="en-US" dirty="0" err="1" smtClean="0"/>
+              <a:t>addClass</a:t>
+            </a:r>
+            <a:r>
+              <a:rPr lang="en-US" dirty="0" smtClean="0"/>
+              <a:t> to start it, both should be pasted in </a:t>
+            </a:r>
+            <a:r>
+              <a:rPr lang="en-US" smtClean="0"/>
+              <a:t>the console</a:t>
             </a:r>
             <a:endParaRPr lang="en-US" dirty="0"/>
           </a:p>
@@ -4107,10 +4124,6 @@
           <a:p>
             <a:pPr lvl="1"/>
             <a:r>
-              <a:rPr lang="en-US" dirty="0" smtClean="0"/>
-              <a:t>.</a:t>
-            </a:r>
-            <a:r>
               <a:rPr lang="en-US" dirty="0" err="1" smtClean="0"/>
               <a:t>img</a:t>
             </a:r>
@@ -4169,7 +4182,6 @@
               <a:rPr lang="en-US" dirty="0" smtClean="0"/>
               <a:t>-transition: margin-left 1s ease;</a:t>
             </a:r>
-            <a:endParaRPr lang="en-US" dirty="0" smtClean="0"/>
           </a:p>
           <a:p>
             <a:pPr marL="914400" lvl="2" indent="0">
@@ -4340,10 +4352,6 @@
             <a:pPr marL="57150" indent="0">
               <a:buNone/>
             </a:pPr>
-            <a:r>
-              <a:rPr lang="en-US" dirty="0" smtClean="0"/>
-              <a:t>.</a:t>
-            </a:r>
             <a:r>
               <a:rPr lang="en-US" dirty="0" err="1" smtClean="0"/>
               <a:t>img</a:t>
@@ -5406,7 +5414,6 @@
               <a:rPr lang="en-US" dirty="0" smtClean="0"/>
               <a:t>(0deg);</a:t>
             </a:r>
-            <a:endParaRPr lang="en-US" dirty="0" smtClean="0"/>
           </a:p>
           <a:p>
             <a:pPr marL="0" indent="0">
@@ -5473,15 +5480,7 @@
             </a:r>
             <a:r>
               <a:rPr lang="en-US" dirty="0" smtClean="0"/>
-              <a:t>(</a:t>
-            </a:r>
-            <a:r>
-              <a:rPr lang="en-US" dirty="0" smtClean="0"/>
-              <a:t>135</a:t>
-            </a:r>
-            <a:r>
-              <a:rPr lang="en-US" dirty="0" smtClean="0"/>
-              <a:t>deg); /* Safari and Chrome */</a:t>
+              <a:t>(135deg); /* Safari and Chrome */</a:t>
             </a:r>
           </a:p>
           <a:p>
@@ -5490,11 +5489,7 @@
             </a:pPr>
             <a:r>
               <a:rPr lang="en-US" dirty="0" smtClean="0"/>
-              <a:t>		</a:t>
-            </a:r>
-            <a:r>
-              <a:rPr lang="en-US" dirty="0" smtClean="0"/>
-              <a:t>transform: </a:t>
+              <a:t>		transform: </a:t>
             </a:r>
             <a:r>
               <a:rPr lang="en-US" dirty="0" err="1" smtClean="0"/>
@@ -5504,7 +5499,6 @@
               <a:rPr lang="en-US" dirty="0" smtClean="0"/>
               <a:t>(135deg);</a:t>
             </a:r>
-            <a:endParaRPr lang="en-US" dirty="0" smtClean="0"/>
           </a:p>
           <a:p>
             <a:pPr marL="0" indent="0">
@@ -5530,11 +5524,7 @@
             </a:pPr>
             <a:r>
               <a:rPr lang="en-US" dirty="0" smtClean="0"/>
-              <a:t>		</a:t>
-            </a:r>
-            <a:r>
-              <a:rPr lang="en-US" dirty="0" smtClean="0"/>
-              <a:t>-</a:t>
+              <a:t>		-</a:t>
             </a:r>
             <a:r>
               <a:rPr lang="en-US" dirty="0" err="1" smtClean="0"/>
@@ -5683,7 +5673,6 @@
               <a:rPr lang="en-US" dirty="0" smtClean="0"/>
               <a:t>(360deg);</a:t>
             </a:r>
-            <a:endParaRPr lang="en-US" dirty="0" smtClean="0"/>
           </a:p>
           <a:p>
             <a:pPr marL="0" indent="0">

</xml_diff>